<commit_message>
[Update] Major chunk added into moodle plugin
</commit_message>
<xml_diff>
--- a/Slide_Generation/generated_presentation.pptx
+++ b/Slide_Generation/generated_presentation.pptx
@@ -13,6 +13,22 @@
     <p:sldId id="261" r:id="rId12"/>
     <p:sldId id="262" r:id="rId13"/>
     <p:sldId id="263" r:id="rId14"/>
+    <p:sldId id="264" r:id="rId15"/>
+    <p:sldId id="265" r:id="rId16"/>
+    <p:sldId id="266" r:id="rId17"/>
+    <p:sldId id="267" r:id="rId18"/>
+    <p:sldId id="268" r:id="rId19"/>
+    <p:sldId id="269" r:id="rId20"/>
+    <p:sldId id="270" r:id="rId21"/>
+    <p:sldId id="271" r:id="rId22"/>
+    <p:sldId id="272" r:id="rId23"/>
+    <p:sldId id="273" r:id="rId24"/>
+    <p:sldId id="274" r:id="rId25"/>
+    <p:sldId id="275" r:id="rId26"/>
+    <p:sldId id="276" r:id="rId27"/>
+    <p:sldId id="277" r:id="rId28"/>
+    <p:sldId id="278" r:id="rId29"/>
+    <p:sldId id="279" r:id="rId30"/>
   </p:sldIdLst>
   <p:sldSz cx="9144000" cy="6858000" type="screen4x3"/>
   <p:notesSz cx="6858000" cy="9144000"/>
@@ -3132,57 +3148,667 @@
           <a:lstStyle/>
           <a:p>
             <a:r>
-              <a:t>Word-Level LSTM Model for Sentence Completion</a:t>
-            </a:r>
-          </a:p>
-          <a:p>
-            <a:r>
-              <a:t>using Shakespeare’s Plays</a:t>
-            </a:r>
-          </a:p>
-          <a:p>
-            <a:r>
-              <a:t>Afaq Alam</a:t>
-            </a:r>
-          </a:p>
-          <a:p>
-            <a:r>
-              <a:t>B.Sc Data Science</a:t>
-            </a:r>
-          </a:p>
-          <a:p>
-            <a:r>
-              <a:t>NUCES-FAST</a:t>
-            </a:r>
-          </a:p>
-          <a:p>
-            <a:r>
-              <a:t>Islamabad, Pakistan</a:t>
-            </a:r>
-          </a:p>
-          <a:p>
-            <a:r>
-              <a:t>Abstract—This paper presents a word-level Long Short-Term</a:t>
-            </a:r>
-          </a:p>
-          <a:p>
-            <a:r>
-              <a:t>Memory (LSTM) model trained on Shakespeare’s plays to predict</a:t>
-            </a:r>
-          </a:p>
-          <a:p>
-            <a:r>
-              <a:t>the next word in a sequence. The model is trained using</a:t>
-            </a:r>
-          </a:p>
-          <a:p>
-            <a:r>
-              <a:t>TensorFlow and Keras on a dataset containing Shakespearean</a:t>
-            </a:r>
-          </a:p>
-          <a:p>
-            <a:r>
-              <a:t>dialogues</a:t>
+              <a:t>BitBlocks </a:t>
+            </a:r>
+          </a:p>
+          <a:p>
+            <a:r>
+              <a:t> </a:t>
+            </a:r>
+          </a:p>
+          <a:p>
+            <a:r>
+              <a:t>Policy Framework </a:t>
+            </a:r>
+          </a:p>
+          <a:p>
+            <a:r>
+              <a:t> </a:t>
+            </a:r>
+          </a:p>
+          <a:p>
+            <a:r>
+              <a:t>Purpose </a:t>
+            </a:r>
+          </a:p>
+          <a:p>
+            <a:r>
+              <a:t>This policy framework provides a clear guide for ethical conduct across all organizational </a:t>
+            </a:r>
+          </a:p>
+          <a:p>
+            <a:r>
+              <a:t>levels of BitBlocks. </a:t>
+            </a:r>
+          </a:p>
+          <a:p>
+            <a:r>
+              <a:t> </a:t>
+            </a:r>
+          </a:p>
+          <a:p>
+            <a:r>
+              <a:t>Introduction </a:t>
+            </a:r>
+          </a:p>
+          <a:p>
+            <a:r>
+              <a:t>➢​ Section 1 outlines foundational principles of integrity, respect, and professionalism</a:t>
+            </a:r>
+          </a:p>
+        </p:txBody>
+      </p:sp>
+    </p:spTree>
+  </p:cSld>
+  <p:clrMapOvr>
+    <a:masterClrMapping/>
+  </p:clrMapOvr>
+</p:sld>
+</file>
+
+<file path=ppt/slides/slide10.xml><?xml version="1.0" encoding="utf-8"?>
+<p:sld xmlns:a="http://schemas.openxmlformats.org/drawingml/2006/main" xmlns:p="http://schemas.openxmlformats.org/presentationml/2006/main" xmlns:r="http://schemas.openxmlformats.org/officeDocument/2006/relationships">
+  <p:cSld>
+    <p:spTree>
+      <p:nvGrpSpPr>
+        <p:cNvPr id="1" name=""/>
+        <p:cNvGrpSpPr/>
+        <p:nvPr/>
+      </p:nvGrpSpPr>
+      <p:grpSpPr/>
+      <p:sp>
+        <p:nvSpPr>
+          <p:cNvPr id="2" name="Title 1"/>
+          <p:cNvSpPr>
+            <a:spLocks noGrp="1"/>
+          </p:cNvSpPr>
+          <p:nvPr>
+            <p:ph type="title"/>
+          </p:nvPr>
+        </p:nvSpPr>
+        <p:spPr/>
+        <p:txBody>
+          <a:bodyPr/>
+          <a:lstStyle/>
+          <a:p>
+            <a:r>
+              <a:t>Key Points</a:t>
+            </a:r>
+          </a:p>
+        </p:txBody>
+      </p:sp>
+      <p:sp>
+        <p:nvSpPr>
+          <p:cNvPr id="3" name="Content Placeholder 2"/>
+          <p:cNvSpPr>
+            <a:spLocks noGrp="1"/>
+          </p:cNvSpPr>
+          <p:nvPr>
+            <p:ph idx="1"/>
+          </p:nvPr>
+        </p:nvSpPr>
+        <p:spPr/>
+        <p:txBody>
+          <a:bodyPr/>
+          <a:lstStyle/>
+          <a:p>
+            <a:r>
+              <a:t>Code of Conduct: Adhere to the company’s code of conduct and ethical guidelines in all professional activities</a:t>
+            </a:r>
+          </a:p>
+          <a:p>
+            <a:r>
+              <a:t>Collaboration:  Collaboration with team members, sharing knowledge and sharing knowledge</a:t>
+            </a:r>
+          </a:p>
+        </p:txBody>
+      </p:sp>
+    </p:spTree>
+  </p:cSld>
+  <p:clrMapOvr>
+    <a:masterClrMapping/>
+  </p:clrMapOvr>
+</p:sld>
+</file>
+
+<file path=ppt/slides/slide11.xml><?xml version="1.0" encoding="utf-8"?>
+<p:sld xmlns:a="http://schemas.openxmlformats.org/drawingml/2006/main" xmlns:p="http://schemas.openxmlformats.org/presentationml/2006/main" xmlns:r="http://schemas.openxmlformats.org/officeDocument/2006/relationships">
+  <p:cSld>
+    <p:spTree>
+      <p:nvGrpSpPr>
+        <p:cNvPr id="1" name=""/>
+        <p:cNvGrpSpPr/>
+        <p:nvPr/>
+      </p:nvGrpSpPr>
+      <p:grpSpPr/>
+      <p:sp>
+        <p:nvSpPr>
+          <p:cNvPr id="2" name="Title 1"/>
+          <p:cNvSpPr>
+            <a:spLocks noGrp="1"/>
+          </p:cNvSpPr>
+          <p:nvPr>
+            <p:ph type="title"/>
+          </p:nvPr>
+        </p:nvSpPr>
+        <p:spPr/>
+        <p:txBody>
+          <a:bodyPr/>
+          <a:lstStyle/>
+          <a:p/>
+        </p:txBody>
+      </p:sp>
+      <p:sp>
+        <p:nvSpPr>
+          <p:cNvPr id="3" name="Content Placeholder 2"/>
+          <p:cNvSpPr>
+            <a:spLocks noGrp="1"/>
+          </p:cNvSpPr>
+          <p:nvPr>
+            <p:ph idx="1"/>
+          </p:nvPr>
+        </p:nvSpPr>
+        <p:spPr/>
+        <p:txBody>
+          <a:bodyPr/>
+          <a:lstStyle/>
+          <a:p>
+            <a:r>
+              <a:t>Professional Development:  Support the professional growth of team members through training,  career development opportunities .</a:t>
+            </a:r>
+          </a:p>
+        </p:txBody>
+      </p:sp>
+    </p:spTree>
+  </p:cSld>
+  <p:clrMapOvr>
+    <a:masterClrMapping/>
+  </p:clrMapOvr>
+</p:sld>
+</file>
+
+<file path=ppt/slides/slide12.xml><?xml version="1.0" encoding="utf-8"?>
+<p:sld xmlns:a="http://schemas.openxmlformats.org/drawingml/2006/main" xmlns:p="http://schemas.openxmlformats.org/presentationml/2006/main" xmlns:r="http://schemas.openxmlformats.org/officeDocument/2006/relationships">
+  <p:cSld>
+    <p:spTree>
+      <p:nvGrpSpPr>
+        <p:cNvPr id="1" name=""/>
+        <p:cNvGrpSpPr/>
+        <p:nvPr/>
+      </p:nvGrpSpPr>
+      <p:grpSpPr/>
+      <p:sp>
+        <p:nvSpPr>
+          <p:cNvPr id="2" name="Title 1"/>
+          <p:cNvSpPr>
+            <a:spLocks noGrp="1"/>
+          </p:cNvSpPr>
+          <p:nvPr>
+            <p:ph type="title"/>
+          </p:nvPr>
+        </p:nvSpPr>
+        <p:spPr/>
+        <p:txBody>
+          <a:bodyPr/>
+          <a:lstStyle/>
+          <a:p>
+            <a:r>
+              <a:t>Key Points</a:t>
+            </a:r>
+          </a:p>
+        </p:txBody>
+      </p:sp>
+      <p:sp>
+        <p:nvSpPr>
+          <p:cNvPr id="3" name="Content Placeholder 2"/>
+          <p:cNvSpPr>
+            <a:spLocks noGrp="1"/>
+          </p:cNvSpPr>
+          <p:nvPr>
+            <p:ph idx="1"/>
+          </p:nvPr>
+        </p:nvSpPr>
+        <p:spPr/>
+        <p:txBody>
+          <a:bodyPr/>
+          <a:lstStyle/>
+          <a:p>
+            <a:r>
+              <a:t>Employees are entitled to 20 paid annual leave days per year</a:t>
+            </a:r>
+          </a:p>
+          <a:p>
+            <a:r>
+              <a:t>Salaries are disbursed on the 5th of every month</a:t>
+            </a:r>
+          </a:p>
+        </p:txBody>
+      </p:sp>
+    </p:spTree>
+  </p:cSld>
+  <p:clrMapOvr>
+    <a:masterClrMapping/>
+  </p:clrMapOvr>
+</p:sld>
+</file>
+
+<file path=ppt/slides/slide13.xml><?xml version="1.0" encoding="utf-8"?>
+<p:sld xmlns:a="http://schemas.openxmlformats.org/drawingml/2006/main" xmlns:p="http://schemas.openxmlformats.org/presentationml/2006/main" xmlns:r="http://schemas.openxmlformats.org/officeDocument/2006/relationships">
+  <p:cSld>
+    <p:spTree>
+      <p:nvGrpSpPr>
+        <p:cNvPr id="1" name=""/>
+        <p:cNvGrpSpPr/>
+        <p:nvPr/>
+      </p:nvGrpSpPr>
+      <p:grpSpPr/>
+      <p:sp>
+        <p:nvSpPr>
+          <p:cNvPr id="2" name="Title 1"/>
+          <p:cNvSpPr>
+            <a:spLocks noGrp="1"/>
+          </p:cNvSpPr>
+          <p:nvPr>
+            <p:ph type="title"/>
+          </p:nvPr>
+        </p:nvSpPr>
+        <p:spPr/>
+        <p:txBody>
+          <a:bodyPr/>
+          <a:lstStyle/>
+          <a:p/>
+        </p:txBody>
+      </p:sp>
+      <p:sp>
+        <p:nvSpPr>
+          <p:cNvPr id="3" name="Content Placeholder 2"/>
+          <p:cNvSpPr>
+            <a:spLocks noGrp="1"/>
+          </p:cNvSpPr>
+          <p:nvPr>
+            <p:ph idx="1"/>
+          </p:nvPr>
+        </p:nvSpPr>
+        <p:spPr/>
+        <p:txBody>
+          <a:bodyPr/>
+          <a:lstStyle/>
+          <a:p>
+            <a:r>
+              <a:t>Employees are required to report financial discrepancies immediately</a:t>
+            </a:r>
+          </a:p>
+          <a:p>
+            <a:r>
+              <a:t>Maternity leave is provided for 90 days, while paternity leave is available for 30 .</a:t>
+            </a:r>
+          </a:p>
+        </p:txBody>
+      </p:sp>
+    </p:spTree>
+  </p:cSld>
+  <p:clrMapOvr>
+    <a:masterClrMapping/>
+  </p:clrMapOvr>
+</p:sld>
+</file>
+
+<file path=ppt/slides/slide14.xml><?xml version="1.0" encoding="utf-8"?>
+<p:sld xmlns:a="http://schemas.openxmlformats.org/drawingml/2006/main" xmlns:p="http://schemas.openxmlformats.org/presentationml/2006/main" xmlns:r="http://schemas.openxmlformats.org/officeDocument/2006/relationships">
+  <p:cSld>
+    <p:spTree>
+      <p:nvGrpSpPr>
+        <p:cNvPr id="1" name=""/>
+        <p:cNvGrpSpPr/>
+        <p:nvPr/>
+      </p:nvGrpSpPr>
+      <p:grpSpPr/>
+      <p:sp>
+        <p:nvSpPr>
+          <p:cNvPr id="2" name="Title 1"/>
+          <p:cNvSpPr>
+            <a:spLocks noGrp="1"/>
+          </p:cNvSpPr>
+          <p:nvPr>
+            <p:ph type="title"/>
+          </p:nvPr>
+        </p:nvSpPr>
+        <p:spPr/>
+        <p:txBody>
+          <a:bodyPr/>
+          <a:lstStyle/>
+          <a:p>
+            <a:r>
+              <a:t>Key Points</a:t>
+            </a:r>
+          </a:p>
+        </p:txBody>
+      </p:sp>
+      <p:sp>
+        <p:nvSpPr>
+          <p:cNvPr id="3" name="Content Placeholder 2"/>
+          <p:cNvSpPr>
+            <a:spLocks noGrp="1"/>
+          </p:cNvSpPr>
+          <p:nvPr>
+            <p:ph idx="1"/>
+          </p:nvPr>
+        </p:nvSpPr>
+        <p:spPr/>
+        <p:txBody>
+          <a:bodyPr/>
+          <a:lstStyle/>
+          <a:p>
+            <a:r>
+              <a:t>Standard work hours are from 9 AM to 5 PM, Monday to Friday</a:t>
+            </a:r>
+          </a:p>
+          <a:p>
+            <a:r>
+              <a:t>Overtime is compensated at x1.5 regular pay for extra hours</a:t>
+            </a:r>
+          </a:p>
+        </p:txBody>
+      </p:sp>
+    </p:spTree>
+  </p:cSld>
+  <p:clrMapOvr>
+    <a:masterClrMapping/>
+  </p:clrMapOvr>
+</p:sld>
+</file>
+
+<file path=ppt/slides/slide15.xml><?xml version="1.0" encoding="utf-8"?>
+<p:sld xmlns:a="http://schemas.openxmlformats.org/drawingml/2006/main" xmlns:p="http://schemas.openxmlformats.org/presentationml/2006/main" xmlns:r="http://schemas.openxmlformats.org/officeDocument/2006/relationships">
+  <p:cSld>
+    <p:spTree>
+      <p:nvGrpSpPr>
+        <p:cNvPr id="1" name=""/>
+        <p:cNvGrpSpPr/>
+        <p:nvPr/>
+      </p:nvGrpSpPr>
+      <p:grpSpPr/>
+      <p:sp>
+        <p:nvSpPr>
+          <p:cNvPr id="2" name="Title 1"/>
+          <p:cNvSpPr>
+            <a:spLocks noGrp="1"/>
+          </p:cNvSpPr>
+          <p:nvPr>
+            <p:ph type="title"/>
+          </p:nvPr>
+        </p:nvSpPr>
+        <p:spPr/>
+        <p:txBody>
+          <a:bodyPr/>
+          <a:lstStyle/>
+          <a:p/>
+        </p:txBody>
+      </p:sp>
+      <p:sp>
+        <p:nvSpPr>
+          <p:cNvPr id="3" name="Content Placeholder 2"/>
+          <p:cNvSpPr>
+            <a:spLocks noGrp="1"/>
+          </p:cNvSpPr>
+          <p:nvPr>
+            <p:ph idx="1"/>
+          </p:nvPr>
+        </p:nvSpPr>
+        <p:spPr/>
+        <p:txBody>
+          <a:bodyPr/>
+          <a:lstStyle/>
+          <a:p>
+            <a:r>
+              <a:t>Remote work is subject to approval based on role requirements</a:t>
+            </a:r>
+          </a:p>
+          <a:p>
+            <a:r>
+              <a:t>Cybersecurity protocols must be followed when accessing company systems remotely .</a:t>
+            </a:r>
+          </a:p>
+        </p:txBody>
+      </p:sp>
+    </p:spTree>
+  </p:cSld>
+  <p:clrMapOvr>
+    <a:masterClrMapping/>
+  </p:clrMapOvr>
+</p:sld>
+</file>
+
+<file path=ppt/slides/slide16.xml><?xml version="1.0" encoding="utf-8"?>
+<p:sld xmlns:a="http://schemas.openxmlformats.org/drawingml/2006/main" xmlns:p="http://schemas.openxmlformats.org/presentationml/2006/main" xmlns:r="http://schemas.openxmlformats.org/officeDocument/2006/relationships">
+  <p:cSld>
+    <p:spTree>
+      <p:nvGrpSpPr>
+        <p:cNvPr id="1" name=""/>
+        <p:cNvGrpSpPr/>
+        <p:nvPr/>
+      </p:nvGrpSpPr>
+      <p:grpSpPr/>
+      <p:sp>
+        <p:nvSpPr>
+          <p:cNvPr id="2" name="Title 1"/>
+          <p:cNvSpPr>
+            <a:spLocks noGrp="1"/>
+          </p:cNvSpPr>
+          <p:nvPr>
+            <p:ph type="title"/>
+          </p:nvPr>
+        </p:nvSpPr>
+        <p:spPr/>
+        <p:txBody>
+          <a:bodyPr/>
+          <a:lstStyle/>
+          <a:p>
+            <a:r>
+              <a:t>Key Points</a:t>
+            </a:r>
+          </a:p>
+        </p:txBody>
+      </p:sp>
+      <p:sp>
+        <p:nvSpPr>
+          <p:cNvPr id="3" name="Content Placeholder 2"/>
+          <p:cNvSpPr>
+            <a:spLocks noGrp="1"/>
+          </p:cNvSpPr>
+          <p:nvPr>
+            <p:ph idx="1"/>
+          </p:nvPr>
+        </p:nvSpPr>
+        <p:spPr/>
+        <p:txBody>
+          <a:bodyPr/>
+          <a:lstStyle/>
+          <a:p>
+            <a:r>
+              <a:t>Ethics Hotline or reporting system for employees to report unethical behavior or concerns without fear of retaliation</a:t>
+            </a:r>
+          </a:p>
+          <a:p>
+            <a:r>
+              <a:t>Disciplinary actions may include warnings, suspension, or termination</a:t>
+            </a:r>
+          </a:p>
+        </p:txBody>
+      </p:sp>
+    </p:spTree>
+  </p:cSld>
+  <p:clrMapOvr>
+    <a:masterClrMapping/>
+  </p:clrMapOvr>
+</p:sld>
+</file>
+
+<file path=ppt/slides/slide17.xml><?xml version="1.0" encoding="utf-8"?>
+<p:sld xmlns:a="http://schemas.openxmlformats.org/drawingml/2006/main" xmlns:p="http://schemas.openxmlformats.org/presentationml/2006/main" xmlns:r="http://schemas.openxmlformats.org/officeDocument/2006/relationships">
+  <p:cSld>
+    <p:spTree>
+      <p:nvGrpSpPr>
+        <p:cNvPr id="1" name=""/>
+        <p:cNvGrpSpPr/>
+        <p:nvPr/>
+      </p:nvGrpSpPr>
+      <p:grpSpPr/>
+      <p:sp>
+        <p:nvSpPr>
+          <p:cNvPr id="2" name="Title 1"/>
+          <p:cNvSpPr>
+            <a:spLocks noGrp="1"/>
+          </p:cNvSpPr>
+          <p:nvPr>
+            <p:ph type="title"/>
+          </p:nvPr>
+        </p:nvSpPr>
+        <p:spPr/>
+        <p:txBody>
+          <a:bodyPr/>
+          <a:lstStyle/>
+          <a:p/>
+        </p:txBody>
+      </p:sp>
+      <p:sp>
+        <p:nvSpPr>
+          <p:cNvPr id="3" name="Content Placeholder 2"/>
+          <p:cNvSpPr>
+            <a:spLocks noGrp="1"/>
+          </p:cNvSpPr>
+          <p:nvPr>
+            <p:ph idx="1"/>
+          </p:nvPr>
+        </p:nvSpPr>
+        <p:spPr/>
+        <p:txBody>
+          <a:bodyPr/>
+          <a:lstStyle/>
+          <a:p>
+            <a:r>
+              <a:t>Open-Door Policy: Employees may approach HR, direct managers, or senior leadership to discuss ethical concerns without formal procedures .</a:t>
+            </a:r>
+          </a:p>
+        </p:txBody>
+      </p:sp>
+    </p:spTree>
+  </p:cSld>
+  <p:clrMapOvr>
+    <a:masterClrMapping/>
+  </p:clrMapOvr>
+</p:sld>
+</file>
+
+<file path=ppt/slides/slide18.xml><?xml version="1.0" encoding="utf-8"?>
+<p:sld xmlns:a="http://schemas.openxmlformats.org/drawingml/2006/main" xmlns:p="http://schemas.openxmlformats.org/presentationml/2006/main" xmlns:r="http://schemas.openxmlformats.org/officeDocument/2006/relationships">
+  <p:cSld>
+    <p:spTree>
+      <p:nvGrpSpPr>
+        <p:cNvPr id="1" name=""/>
+        <p:cNvGrpSpPr/>
+        <p:nvPr/>
+      </p:nvGrpSpPr>
+      <p:grpSpPr/>
+      <p:sp>
+        <p:nvSpPr>
+          <p:cNvPr id="2" name="Title 1"/>
+          <p:cNvSpPr>
+            <a:spLocks noGrp="1"/>
+          </p:cNvSpPr>
+          <p:nvPr>
+            <p:ph type="title"/>
+          </p:nvPr>
+        </p:nvSpPr>
+        <p:spPr/>
+        <p:txBody>
+          <a:bodyPr/>
+          <a:lstStyle/>
+          <a:p>
+            <a:r>
+              <a:t>Key Points</a:t>
+            </a:r>
+          </a:p>
+        </p:txBody>
+      </p:sp>
+      <p:sp>
+        <p:nvSpPr>
+          <p:cNvPr id="3" name="Content Placeholder 2"/>
+          <p:cNvSpPr>
+            <a:spLocks noGrp="1"/>
+          </p:cNvSpPr>
+          <p:nvPr>
+            <p:ph idx="1"/>
+          </p:nvPr>
+        </p:nvSpPr>
+        <p:spPr/>
+        <p:txBody>
+          <a:bodyPr/>
+          <a:lstStyle/>
+          <a:p>
+            <a:r>
+              <a:t>Tier 1 – Entry-Level (Interns, Junior Developers, Support Staff) Employees in this tier perform basic tasks such as coding, testing, and assisting senior staff</a:t>
+            </a:r>
+          </a:p>
+          <a:p>
+            <a:r>
+              <a:t>Tier 2 – Mid-Level employees are responsible for designing, coding, leading small teams, executing projects, and managing financial operations</a:t>
+            </a:r>
+          </a:p>
+        </p:txBody>
+      </p:sp>
+    </p:spTree>
+  </p:cSld>
+  <p:clrMapOvr>
+    <a:masterClrMapping/>
+  </p:clrMapOvr>
+</p:sld>
+</file>
+
+<file path=ppt/slides/slide19.xml><?xml version="1.0" encoding="utf-8"?>
+<p:sld xmlns:a="http://schemas.openxmlformats.org/drawingml/2006/main" xmlns:p="http://schemas.openxmlformats.org/presentationml/2006/main" xmlns:r="http://schemas.openxmlformats.org/officeDocument/2006/relationships">
+  <p:cSld>
+    <p:spTree>
+      <p:nvGrpSpPr>
+        <p:cNvPr id="1" name=""/>
+        <p:cNvGrpSpPr/>
+        <p:nvPr/>
+      </p:nvGrpSpPr>
+      <p:grpSpPr/>
+      <p:sp>
+        <p:nvSpPr>
+          <p:cNvPr id="2" name="Title 1"/>
+          <p:cNvSpPr>
+            <a:spLocks noGrp="1"/>
+          </p:cNvSpPr>
+          <p:nvPr>
+            <p:ph type="title"/>
+          </p:nvPr>
+        </p:nvSpPr>
+        <p:spPr/>
+        <p:txBody>
+          <a:bodyPr/>
+          <a:lstStyle/>
+          <a:p/>
+        </p:txBody>
+      </p:sp>
+      <p:sp>
+        <p:nvSpPr>
+          <p:cNvPr id="3" name="Content Placeholder 2"/>
+          <p:cNvSpPr>
+            <a:spLocks noGrp="1"/>
+          </p:cNvSpPr>
+          <p:nvPr>
+            <p:ph idx="1"/>
+          </p:nvPr>
+        </p:nvSpPr>
+        <p:spPr/>
+        <p:txBody>
+          <a:bodyPr/>
+          <a:lstStyle/>
+          <a:p>
+            <a:r>
+              <a:t>Tier 3 – Senior-level (Senior Developers, Managers, HR Heads)</a:t>
             </a:r>
           </a:p>
         </p:txBody>
@@ -3242,12 +3868,314 @@
           <a:lstStyle/>
           <a:p>
             <a:r>
-              <a:t>A word-level LSTM model is trained on Shakespeare’s plays to predict the next word in a sequence</a:t>
-            </a:r>
-          </a:p>
-          <a:p>
-            <a:r>
-              <a:t>The model is integrated with a user-friendly interface that provides real-time word suggestions</a:t>
+              <a:t>The BitBlocks Policy Framework provides a clear guide for ethical conduct across all organizational levels of BitBlocks</a:t>
+            </a:r>
+          </a:p>
+          <a:p>
+            <a:r>
+              <a:t>The policy framework outlines foundational principles of integrity, respect, and professionalism</a:t>
+            </a:r>
+          </a:p>
+        </p:txBody>
+      </p:sp>
+    </p:spTree>
+  </p:cSld>
+  <p:clrMapOvr>
+    <a:masterClrMapping/>
+  </p:clrMapOvr>
+</p:sld>
+</file>
+
+<file path=ppt/slides/slide20.xml><?xml version="1.0" encoding="utf-8"?>
+<p:sld xmlns:a="http://schemas.openxmlformats.org/drawingml/2006/main" xmlns:p="http://schemas.openxmlformats.org/presentationml/2006/main" xmlns:r="http://schemas.openxmlformats.org/officeDocument/2006/relationships">
+  <p:cSld>
+    <p:spTree>
+      <p:nvGrpSpPr>
+        <p:cNvPr id="1" name=""/>
+        <p:cNvGrpSpPr/>
+        <p:nvPr/>
+      </p:nvGrpSpPr>
+      <p:grpSpPr/>
+      <p:sp>
+        <p:nvSpPr>
+          <p:cNvPr id="2" name="Title 1"/>
+          <p:cNvSpPr>
+            <a:spLocks noGrp="1"/>
+          </p:cNvSpPr>
+          <p:nvPr>
+            <p:ph type="title"/>
+          </p:nvPr>
+        </p:nvSpPr>
+        <p:spPr/>
+        <p:txBody>
+          <a:bodyPr/>
+          <a:lstStyle/>
+          <a:p>
+            <a:r>
+              <a:t>Key Points</a:t>
+            </a:r>
+          </a:p>
+        </p:txBody>
+      </p:sp>
+      <p:sp>
+        <p:nvSpPr>
+          <p:cNvPr id="3" name="Content Placeholder 2"/>
+          <p:cNvSpPr>
+            <a:spLocks noGrp="1"/>
+          </p:cNvSpPr>
+          <p:nvPr>
+            <p:ph idx="1"/>
+          </p:nvPr>
+        </p:nvSpPr>
+        <p:spPr/>
+        <p:txBody>
+          <a:bodyPr/>
+          <a:lstStyle/>
+          <a:p>
+            <a:r>
+              <a:t>Tier 4 – Executive-Level (Directors, C-Suite, Board Members) requires strategic thinking, advanced management, and strong stakeholder communication skills</a:t>
+            </a:r>
+          </a:p>
+          <a:p>
+            <a:r>
+              <a:t>They must possess visionary leadership, corporate governance expertise, and  visionary leadership</a:t>
+            </a:r>
+          </a:p>
+        </p:txBody>
+      </p:sp>
+    </p:spTree>
+  </p:cSld>
+  <p:clrMapOvr>
+    <a:masterClrMapping/>
+  </p:clrMapOvr>
+</p:sld>
+</file>
+
+<file path=ppt/slides/slide21.xml><?xml version="1.0" encoding="utf-8"?>
+<p:sld xmlns:a="http://schemas.openxmlformats.org/drawingml/2006/main" xmlns:p="http://schemas.openxmlformats.org/presentationml/2006/main" xmlns:r="http://schemas.openxmlformats.org/officeDocument/2006/relationships">
+  <p:cSld>
+    <p:spTree>
+      <p:nvGrpSpPr>
+        <p:cNvPr id="1" name=""/>
+        <p:cNvGrpSpPr/>
+        <p:nvPr/>
+      </p:nvGrpSpPr>
+      <p:grpSpPr/>
+      <p:sp>
+        <p:nvSpPr>
+          <p:cNvPr id="2" name="Title 1"/>
+          <p:cNvSpPr>
+            <a:spLocks noGrp="1"/>
+          </p:cNvSpPr>
+          <p:nvPr>
+            <p:ph type="title"/>
+          </p:nvPr>
+        </p:nvSpPr>
+        <p:spPr/>
+        <p:txBody>
+          <a:bodyPr/>
+          <a:lstStyle/>
+          <a:p/>
+        </p:txBody>
+      </p:sp>
+      <p:sp>
+        <p:nvSpPr>
+          <p:cNvPr id="3" name="Content Placeholder 2"/>
+          <p:cNvSpPr>
+            <a:spLocks noGrp="1"/>
+          </p:cNvSpPr>
+          <p:nvPr>
+            <p:ph idx="1"/>
+          </p:nvPr>
+        </p:nvSpPr>
+        <p:spPr/>
+        <p:txBody>
+          <a:bodyPr/>
+          <a:lstStyle/>
+          <a:p>
+            <a:r>
+              <a:t>The BitBlock policy framework will be reviewed by company stakeholders and human  resources within 3 weeks .</a:t>
+            </a:r>
+          </a:p>
+        </p:txBody>
+      </p:sp>
+    </p:spTree>
+  </p:cSld>
+  <p:clrMapOvr>
+    <a:masterClrMapping/>
+  </p:clrMapOvr>
+</p:sld>
+</file>
+
+<file path=ppt/slides/slide22.xml><?xml version="1.0" encoding="utf-8"?>
+<p:sld xmlns:a="http://schemas.openxmlformats.org/drawingml/2006/main" xmlns:p="http://schemas.openxmlformats.org/presentationml/2006/main" xmlns:r="http://schemas.openxmlformats.org/officeDocument/2006/relationships">
+  <p:cSld>
+    <p:spTree>
+      <p:nvGrpSpPr>
+        <p:cNvPr id="1" name=""/>
+        <p:cNvGrpSpPr/>
+        <p:nvPr/>
+      </p:nvGrpSpPr>
+      <p:grpSpPr/>
+      <p:sp>
+        <p:nvSpPr>
+          <p:cNvPr id="2" name="Title 1"/>
+          <p:cNvSpPr>
+            <a:spLocks noGrp="1"/>
+          </p:cNvSpPr>
+          <p:nvPr>
+            <p:ph type="title"/>
+          </p:nvPr>
+        </p:nvSpPr>
+        <p:spPr/>
+        <p:txBody>
+          <a:bodyPr/>
+          <a:lstStyle/>
+          <a:p>
+            <a:r>
+              <a:t>Key Points</a:t>
+            </a:r>
+          </a:p>
+        </p:txBody>
+      </p:sp>
+      <p:sp>
+        <p:nvSpPr>
+          <p:cNvPr id="3" name="Content Placeholder 2"/>
+          <p:cNvSpPr>
+            <a:spLocks noGrp="1"/>
+          </p:cNvSpPr>
+          <p:nvPr>
+            <p:ph idx="1"/>
+          </p:nvPr>
+        </p:nvSpPr>
+        <p:spPr/>
+        <p:txBody>
+          <a:bodyPr/>
+          <a:lstStyle/>
+          <a:p>
+            <a:r>
+              <a:t>Any revision in the proposed changes will undergo the same procedure from the  beginning</a:t>
+            </a:r>
+          </a:p>
+          <a:p>
+            <a:r>
+              <a:t>The changes will be implemented in the same manner from the beginning of the year 2025</a:t>
+            </a:r>
+          </a:p>
+        </p:txBody>
+      </p:sp>
+    </p:spTree>
+  </p:cSld>
+  <p:clrMapOvr>
+    <a:masterClrMapping/>
+  </p:clrMapOvr>
+</p:sld>
+</file>
+
+<file path=ppt/slides/slide23.xml><?xml version="1.0" encoding="utf-8"?>
+<p:sld xmlns:a="http://schemas.openxmlformats.org/drawingml/2006/main" xmlns:p="http://schemas.openxmlformats.org/presentationml/2006/main" xmlns:r="http://schemas.openxmlformats.org/officeDocument/2006/relationships">
+  <p:cSld>
+    <p:spTree>
+      <p:nvGrpSpPr>
+        <p:cNvPr id="1" name=""/>
+        <p:cNvGrpSpPr/>
+        <p:nvPr/>
+      </p:nvGrpSpPr>
+      <p:grpSpPr/>
+      <p:sp>
+        <p:nvSpPr>
+          <p:cNvPr id="2" name="Title 1"/>
+          <p:cNvSpPr>
+            <a:spLocks noGrp="1"/>
+          </p:cNvSpPr>
+          <p:nvPr>
+            <p:ph type="title"/>
+          </p:nvPr>
+        </p:nvSpPr>
+        <p:spPr/>
+        <p:txBody>
+          <a:bodyPr/>
+          <a:lstStyle/>
+          <a:p/>
+        </p:txBody>
+      </p:sp>
+      <p:sp>
+        <p:nvSpPr>
+          <p:cNvPr id="3" name="Content Placeholder 2"/>
+          <p:cNvSpPr>
+            <a:spLocks noGrp="1"/>
+          </p:cNvSpPr>
+          <p:nvPr>
+            <p:ph idx="1"/>
+          </p:nvPr>
+        </p:nvSpPr>
+        <p:spPr/>
+        <p:txBody>
+          <a:bodyPr/>
+          <a:lstStyle/>
+          <a:p>
+            <a:r>
+              <a:t>Any changes will have to be made to comply with the requirements of the current system .</a:t>
+            </a:r>
+          </a:p>
+        </p:txBody>
+      </p:sp>
+    </p:spTree>
+  </p:cSld>
+  <p:clrMapOvr>
+    <a:masterClrMapping/>
+  </p:clrMapOvr>
+</p:sld>
+</file>
+
+<file path=ppt/slides/slide24.xml><?xml version="1.0" encoding="utf-8"?>
+<p:sld xmlns:a="http://schemas.openxmlformats.org/drawingml/2006/main" xmlns:p="http://schemas.openxmlformats.org/presentationml/2006/main" xmlns:r="http://schemas.openxmlformats.org/officeDocument/2006/relationships">
+  <p:cSld>
+    <p:spTree>
+      <p:nvGrpSpPr>
+        <p:cNvPr id="1" name=""/>
+        <p:cNvGrpSpPr/>
+        <p:nvPr/>
+      </p:nvGrpSpPr>
+      <p:grpSpPr/>
+      <p:sp>
+        <p:nvSpPr>
+          <p:cNvPr id="2" name="Title 1"/>
+          <p:cNvSpPr>
+            <a:spLocks noGrp="1"/>
+          </p:cNvSpPr>
+          <p:nvPr>
+            <p:ph type="title"/>
+          </p:nvPr>
+        </p:nvSpPr>
+        <p:spPr/>
+        <p:txBody>
+          <a:bodyPr/>
+          <a:lstStyle/>
+          <a:p>
+            <a:r>
+              <a:t>Summary</a:t>
+            </a:r>
+          </a:p>
+        </p:txBody>
+      </p:sp>
+      <p:sp>
+        <p:nvSpPr>
+          <p:cNvPr id="3" name="Content Placeholder 2"/>
+          <p:cNvSpPr>
+            <a:spLocks noGrp="1"/>
+          </p:cNvSpPr>
+          <p:nvPr>
+            <p:ph idx="1"/>
+          </p:nvPr>
+        </p:nvSpPr>
+        <p:spPr/>
+        <p:txBody>
+          <a:bodyPr/>
+          <a:lstStyle/>
+          <a:p>
+            <a:r>
+              <a:t> Any revision in the proposed changes will undergo the same procedure from the  beginning . The changes will be implemented in the same manner from the beginning of the year 2025 . Any changes will have to be made to comply with the requirements of the current system .</a:t>
             </a:r>
           </a:p>
         </p:txBody>
@@ -3303,7 +4231,7 @@
           <a:lstStyle/>
           <a:p>
             <a:r>
-              <a:t>The report discusses the preprocessing steps, model architecture, results, and challenges encountered during implementation .</a:t>
+              <a:t>The Policy Change Procedure ensures that modifications to the BitBlocks policy are review .</a:t>
             </a:r>
           </a:p>
         </p:txBody>
@@ -3363,12 +4291,12 @@
           <a:lstStyle/>
           <a:p>
             <a:r>
-              <a:t>The Shakespeare Plays dataset was obtained from Kaggle and includes dialogues from various plays written by William Shakespeare</a:t>
-            </a:r>
-          </a:p>
-          <a:p>
-            <a:r>
-              <a:t>The study also explores how hyperparameters are used to evaluate the accuracy of the model’s accuracy and evaluates the coherence of the sentences .</a:t>
+              <a:t>All employees must act with honesty, transparency, and fairness in all professional interactions</a:t>
+            </a:r>
+          </a:p>
+          <a:p>
+            <a:r>
+              <a:t>Treat colleagues, clients,janitorial staff, security team and stakeholders with respect</a:t>
             </a:r>
           </a:p>
         </p:txBody>
@@ -3405,11 +4333,7 @@
         <p:txBody>
           <a:bodyPr/>
           <a:lstStyle/>
-          <a:p>
-            <a:r>
-              <a:t>Key Points</a:t>
-            </a:r>
-          </a:p>
+          <a:p/>
         </p:txBody>
       </p:sp>
       <p:sp>
@@ -3428,12 +4352,12 @@
           <a:lstStyle/>
           <a:p>
             <a:r>
-              <a:t>The e300 b128 model achieved 91.14% accuracy</a:t>
-            </a:r>
-          </a:p>
-          <a:p>
-            <a:r>
-              <a:t>Larger batch sizes (e.g., 128) lead to faster convergence but may generalize less than smaller batch sizes</a:t>
+              <a:t>Protect sensitive company, client, and user data</a:t>
+            </a:r>
+          </a:p>
+          <a:p>
+            <a:r>
+              <a:t>Adhere to all applicable laws, regulations, and industry standards .</a:t>
             </a:r>
           </a:p>
         </p:txBody>
@@ -3470,7 +4394,11 @@
         <p:txBody>
           <a:bodyPr/>
           <a:lstStyle/>
-          <a:p/>
+          <a:p>
+            <a:r>
+              <a:t>Key Points</a:t>
+            </a:r>
+          </a:p>
         </p:txBody>
       </p:sp>
       <p:sp>
@@ -3489,7 +4417,12 @@
           <a:lstStyle/>
           <a:p>
             <a:r>
-              <a:t>Increasing the number of epochs improves accuracy, as seen in the e300 model .</a:t>
+              <a:t>CEO/Board-Level Policies include vision and leadership, accountability, vision and mission</a:t>
+            </a:r>
+          </a:p>
+          <a:p>
+            <a:r>
+              <a:t>Ethical Oversight: Ethical oversight, ensure compliance with the ACM and IEEE codes</a:t>
             </a:r>
           </a:p>
         </p:txBody>
@@ -3526,11 +4459,7 @@
         <p:txBody>
           <a:bodyPr/>
           <a:lstStyle/>
-          <a:p>
-            <a:r>
-              <a:t>Key Points</a:t>
-            </a:r>
-          </a:p>
+          <a:p/>
         </p:txBody>
       </p:sp>
       <p:sp>
@@ -3549,12 +4478,7 @@
           <a:lstStyle/>
           <a:p>
             <a:r>
-              <a:t>The e250 b64 model achieves a balance between accu-phthalracy and loss, making it a viable alternative to the highest-performing model</a:t>
-            </a:r>
-          </a:p>
-          <a:p>
-            <a:r>
-              <a:t>A higher number of training epochs and a moderately-high batch size improve model performance, but diminishing returns can occur after a certain threshold .</a:t>
+              <a:t>Accountability: Accountability:  Prioritize employees' well-being and mental health .</a:t>
             </a:r>
           </a:p>
         </p:txBody>
@@ -3593,7 +4517,7 @@
           <a:lstStyle/>
           <a:p>
             <a:r>
-              <a:t>Summary</a:t>
+              <a:t>Key Points</a:t>
             </a:r>
           </a:p>
         </p:txBody>
@@ -3614,7 +4538,68 @@
           <a:lstStyle/>
           <a:p>
             <a:r>
-              <a:t> The e250 b64 model achieves a balance between accu-phthalracy and loss, making it a viable alternative to the highest-performing model . A higher number of training epochs and a moderately-high batch size improve model performance, but diminishing returns can occur after a certain threshold .</a:t>
+              <a:t>Team Leadership: Foster a collaborative and inclusive work environment where team members feel valued and supported</a:t>
+            </a:r>
+          </a:p>
+          <a:p>
+            <a:r>
+              <a:t>Project Management:  Ensure projects are delivered on time, within budget, and meet quality standards</a:t>
+            </a:r>
+          </a:p>
+        </p:txBody>
+      </p:sp>
+    </p:spTree>
+  </p:cSld>
+  <p:clrMapOvr>
+    <a:masterClrMapping/>
+  </p:clrMapOvr>
+</p:sld>
+</file>
+
+<file path=ppt/slides/slide9.xml><?xml version="1.0" encoding="utf-8"?>
+<p:sld xmlns:a="http://schemas.openxmlformats.org/drawingml/2006/main" xmlns:p="http://schemas.openxmlformats.org/presentationml/2006/main" xmlns:r="http://schemas.openxmlformats.org/officeDocument/2006/relationships">
+  <p:cSld>
+    <p:spTree>
+      <p:nvGrpSpPr>
+        <p:cNvPr id="1" name=""/>
+        <p:cNvGrpSpPr/>
+        <p:nvPr/>
+      </p:nvGrpSpPr>
+      <p:grpSpPr/>
+      <p:sp>
+        <p:nvSpPr>
+          <p:cNvPr id="2" name="Title 1"/>
+          <p:cNvSpPr>
+            <a:spLocks noGrp="1"/>
+          </p:cNvSpPr>
+          <p:nvPr>
+            <p:ph type="title"/>
+          </p:nvPr>
+        </p:nvSpPr>
+        <p:spPr/>
+        <p:txBody>
+          <a:bodyPr/>
+          <a:lstStyle/>
+          <a:p/>
+        </p:txBody>
+      </p:sp>
+      <p:sp>
+        <p:nvSpPr>
+          <p:cNvPr id="3" name="Content Placeholder 2"/>
+          <p:cNvSpPr>
+            <a:spLocks noGrp="1"/>
+          </p:cNvSpPr>
+          <p:nvPr>
+            <p:ph idx="1"/>
+          </p:nvPr>
+        </p:nvSpPr>
+        <p:spPr/>
+        <p:txBody>
+          <a:bodyPr/>
+          <a:lstStyle/>
+          <a:p>
+            <a:r>
+              <a:t>Stakeholder Engagement:  Engage with stakeholders (employees, clients, investors, and the public)</a:t>
             </a:r>
           </a:p>
         </p:txBody>

</xml_diff>

<commit_message>
[update] KG teacher side integrated
</commit_message>
<xml_diff>
--- a/Slide_Generation/generated_presentation.pptx
+++ b/Slide_Generation/generated_presentation.pptx
@@ -13,22 +13,6 @@
     <p:sldId id="261" r:id="rId12"/>
     <p:sldId id="262" r:id="rId13"/>
     <p:sldId id="263" r:id="rId14"/>
-    <p:sldId id="264" r:id="rId15"/>
-    <p:sldId id="265" r:id="rId16"/>
-    <p:sldId id="266" r:id="rId17"/>
-    <p:sldId id="267" r:id="rId18"/>
-    <p:sldId id="268" r:id="rId19"/>
-    <p:sldId id="269" r:id="rId20"/>
-    <p:sldId id="270" r:id="rId21"/>
-    <p:sldId id="271" r:id="rId22"/>
-    <p:sldId id="272" r:id="rId23"/>
-    <p:sldId id="273" r:id="rId24"/>
-    <p:sldId id="274" r:id="rId25"/>
-    <p:sldId id="275" r:id="rId26"/>
-    <p:sldId id="276" r:id="rId27"/>
-    <p:sldId id="277" r:id="rId28"/>
-    <p:sldId id="278" r:id="rId29"/>
-    <p:sldId id="279" r:id="rId30"/>
   </p:sldIdLst>
   <p:sldSz cx="9144000" cy="6858000" type="screen4x3"/>
   <p:notesSz cx="6858000" cy="9144000"/>
@@ -3148,667 +3132,57 @@
           <a:lstStyle/>
           <a:p>
             <a:r>
-              <a:t>BitBlocks </a:t>
-            </a:r>
-          </a:p>
-          <a:p>
-            <a:r>
-              <a:t> </a:t>
-            </a:r>
-          </a:p>
-          <a:p>
-            <a:r>
-              <a:t>Policy Framework </a:t>
-            </a:r>
-          </a:p>
-          <a:p>
-            <a:r>
-              <a:t> </a:t>
-            </a:r>
-          </a:p>
-          <a:p>
-            <a:r>
-              <a:t>Purpose </a:t>
-            </a:r>
-          </a:p>
-          <a:p>
-            <a:r>
-              <a:t>This policy framework provides a clear guide for ethical conduct across all organizational </a:t>
-            </a:r>
-          </a:p>
-          <a:p>
-            <a:r>
-              <a:t>levels of BitBlocks. </a:t>
-            </a:r>
-          </a:p>
-          <a:p>
-            <a:r>
-              <a:t> </a:t>
-            </a:r>
-          </a:p>
-          <a:p>
-            <a:r>
-              <a:t>Introduction </a:t>
-            </a:r>
-          </a:p>
-          <a:p>
-            <a:r>
-              <a:t>➢​ Section 1 outlines foundational principles of integrity, respect, and professionalism</a:t>
-            </a:r>
-          </a:p>
-        </p:txBody>
-      </p:sp>
-    </p:spTree>
-  </p:cSld>
-  <p:clrMapOvr>
-    <a:masterClrMapping/>
-  </p:clrMapOvr>
-</p:sld>
-</file>
-
-<file path=ppt/slides/slide10.xml><?xml version="1.0" encoding="utf-8"?>
-<p:sld xmlns:a="http://schemas.openxmlformats.org/drawingml/2006/main" xmlns:p="http://schemas.openxmlformats.org/presentationml/2006/main" xmlns:r="http://schemas.openxmlformats.org/officeDocument/2006/relationships">
-  <p:cSld>
-    <p:spTree>
-      <p:nvGrpSpPr>
-        <p:cNvPr id="1" name=""/>
-        <p:cNvGrpSpPr/>
-        <p:nvPr/>
-      </p:nvGrpSpPr>
-      <p:grpSpPr/>
-      <p:sp>
-        <p:nvSpPr>
-          <p:cNvPr id="2" name="Title 1"/>
-          <p:cNvSpPr>
-            <a:spLocks noGrp="1"/>
-          </p:cNvSpPr>
-          <p:nvPr>
-            <p:ph type="title"/>
-          </p:nvPr>
-        </p:nvSpPr>
-        <p:spPr/>
-        <p:txBody>
-          <a:bodyPr/>
-          <a:lstStyle/>
-          <a:p>
-            <a:r>
-              <a:t>Key Points</a:t>
-            </a:r>
-          </a:p>
-        </p:txBody>
-      </p:sp>
-      <p:sp>
-        <p:nvSpPr>
-          <p:cNvPr id="3" name="Content Placeholder 2"/>
-          <p:cNvSpPr>
-            <a:spLocks noGrp="1"/>
-          </p:cNvSpPr>
-          <p:nvPr>
-            <p:ph idx="1"/>
-          </p:nvPr>
-        </p:nvSpPr>
-        <p:spPr/>
-        <p:txBody>
-          <a:bodyPr/>
-          <a:lstStyle/>
-          <a:p>
-            <a:r>
-              <a:t>Code of Conduct: Adhere to the company’s code of conduct and ethical guidelines in all professional activities</a:t>
-            </a:r>
-          </a:p>
-          <a:p>
-            <a:r>
-              <a:t>Collaboration:  Collaboration with team members, sharing knowledge and sharing knowledge</a:t>
-            </a:r>
-          </a:p>
-        </p:txBody>
-      </p:sp>
-    </p:spTree>
-  </p:cSld>
-  <p:clrMapOvr>
-    <a:masterClrMapping/>
-  </p:clrMapOvr>
-</p:sld>
-</file>
-
-<file path=ppt/slides/slide11.xml><?xml version="1.0" encoding="utf-8"?>
-<p:sld xmlns:a="http://schemas.openxmlformats.org/drawingml/2006/main" xmlns:p="http://schemas.openxmlformats.org/presentationml/2006/main" xmlns:r="http://schemas.openxmlformats.org/officeDocument/2006/relationships">
-  <p:cSld>
-    <p:spTree>
-      <p:nvGrpSpPr>
-        <p:cNvPr id="1" name=""/>
-        <p:cNvGrpSpPr/>
-        <p:nvPr/>
-      </p:nvGrpSpPr>
-      <p:grpSpPr/>
-      <p:sp>
-        <p:nvSpPr>
-          <p:cNvPr id="2" name="Title 1"/>
-          <p:cNvSpPr>
-            <a:spLocks noGrp="1"/>
-          </p:cNvSpPr>
-          <p:nvPr>
-            <p:ph type="title"/>
-          </p:nvPr>
-        </p:nvSpPr>
-        <p:spPr/>
-        <p:txBody>
-          <a:bodyPr/>
-          <a:lstStyle/>
-          <a:p/>
-        </p:txBody>
-      </p:sp>
-      <p:sp>
-        <p:nvSpPr>
-          <p:cNvPr id="3" name="Content Placeholder 2"/>
-          <p:cNvSpPr>
-            <a:spLocks noGrp="1"/>
-          </p:cNvSpPr>
-          <p:nvPr>
-            <p:ph idx="1"/>
-          </p:nvPr>
-        </p:nvSpPr>
-        <p:spPr/>
-        <p:txBody>
-          <a:bodyPr/>
-          <a:lstStyle/>
-          <a:p>
-            <a:r>
-              <a:t>Professional Development:  Support the professional growth of team members through training,  career development opportunities .</a:t>
-            </a:r>
-          </a:p>
-        </p:txBody>
-      </p:sp>
-    </p:spTree>
-  </p:cSld>
-  <p:clrMapOvr>
-    <a:masterClrMapping/>
-  </p:clrMapOvr>
-</p:sld>
-</file>
-
-<file path=ppt/slides/slide12.xml><?xml version="1.0" encoding="utf-8"?>
-<p:sld xmlns:a="http://schemas.openxmlformats.org/drawingml/2006/main" xmlns:p="http://schemas.openxmlformats.org/presentationml/2006/main" xmlns:r="http://schemas.openxmlformats.org/officeDocument/2006/relationships">
-  <p:cSld>
-    <p:spTree>
-      <p:nvGrpSpPr>
-        <p:cNvPr id="1" name=""/>
-        <p:cNvGrpSpPr/>
-        <p:nvPr/>
-      </p:nvGrpSpPr>
-      <p:grpSpPr/>
-      <p:sp>
-        <p:nvSpPr>
-          <p:cNvPr id="2" name="Title 1"/>
-          <p:cNvSpPr>
-            <a:spLocks noGrp="1"/>
-          </p:cNvSpPr>
-          <p:nvPr>
-            <p:ph type="title"/>
-          </p:nvPr>
-        </p:nvSpPr>
-        <p:spPr/>
-        <p:txBody>
-          <a:bodyPr/>
-          <a:lstStyle/>
-          <a:p>
-            <a:r>
-              <a:t>Key Points</a:t>
-            </a:r>
-          </a:p>
-        </p:txBody>
-      </p:sp>
-      <p:sp>
-        <p:nvSpPr>
-          <p:cNvPr id="3" name="Content Placeholder 2"/>
-          <p:cNvSpPr>
-            <a:spLocks noGrp="1"/>
-          </p:cNvSpPr>
-          <p:nvPr>
-            <p:ph idx="1"/>
-          </p:nvPr>
-        </p:nvSpPr>
-        <p:spPr/>
-        <p:txBody>
-          <a:bodyPr/>
-          <a:lstStyle/>
-          <a:p>
-            <a:r>
-              <a:t>Employees are entitled to 20 paid annual leave days per year</a:t>
-            </a:r>
-          </a:p>
-          <a:p>
-            <a:r>
-              <a:t>Salaries are disbursed on the 5th of every month</a:t>
-            </a:r>
-          </a:p>
-        </p:txBody>
-      </p:sp>
-    </p:spTree>
-  </p:cSld>
-  <p:clrMapOvr>
-    <a:masterClrMapping/>
-  </p:clrMapOvr>
-</p:sld>
-</file>
-
-<file path=ppt/slides/slide13.xml><?xml version="1.0" encoding="utf-8"?>
-<p:sld xmlns:a="http://schemas.openxmlformats.org/drawingml/2006/main" xmlns:p="http://schemas.openxmlformats.org/presentationml/2006/main" xmlns:r="http://schemas.openxmlformats.org/officeDocument/2006/relationships">
-  <p:cSld>
-    <p:spTree>
-      <p:nvGrpSpPr>
-        <p:cNvPr id="1" name=""/>
-        <p:cNvGrpSpPr/>
-        <p:nvPr/>
-      </p:nvGrpSpPr>
-      <p:grpSpPr/>
-      <p:sp>
-        <p:nvSpPr>
-          <p:cNvPr id="2" name="Title 1"/>
-          <p:cNvSpPr>
-            <a:spLocks noGrp="1"/>
-          </p:cNvSpPr>
-          <p:nvPr>
-            <p:ph type="title"/>
-          </p:nvPr>
-        </p:nvSpPr>
-        <p:spPr/>
-        <p:txBody>
-          <a:bodyPr/>
-          <a:lstStyle/>
-          <a:p/>
-        </p:txBody>
-      </p:sp>
-      <p:sp>
-        <p:nvSpPr>
-          <p:cNvPr id="3" name="Content Placeholder 2"/>
-          <p:cNvSpPr>
-            <a:spLocks noGrp="1"/>
-          </p:cNvSpPr>
-          <p:nvPr>
-            <p:ph idx="1"/>
-          </p:nvPr>
-        </p:nvSpPr>
-        <p:spPr/>
-        <p:txBody>
-          <a:bodyPr/>
-          <a:lstStyle/>
-          <a:p>
-            <a:r>
-              <a:t>Employees are required to report financial discrepancies immediately</a:t>
-            </a:r>
-          </a:p>
-          <a:p>
-            <a:r>
-              <a:t>Maternity leave is provided for 90 days, while paternity leave is available for 30 .</a:t>
-            </a:r>
-          </a:p>
-        </p:txBody>
-      </p:sp>
-    </p:spTree>
-  </p:cSld>
-  <p:clrMapOvr>
-    <a:masterClrMapping/>
-  </p:clrMapOvr>
-</p:sld>
-</file>
-
-<file path=ppt/slides/slide14.xml><?xml version="1.0" encoding="utf-8"?>
-<p:sld xmlns:a="http://schemas.openxmlformats.org/drawingml/2006/main" xmlns:p="http://schemas.openxmlformats.org/presentationml/2006/main" xmlns:r="http://schemas.openxmlformats.org/officeDocument/2006/relationships">
-  <p:cSld>
-    <p:spTree>
-      <p:nvGrpSpPr>
-        <p:cNvPr id="1" name=""/>
-        <p:cNvGrpSpPr/>
-        <p:nvPr/>
-      </p:nvGrpSpPr>
-      <p:grpSpPr/>
-      <p:sp>
-        <p:nvSpPr>
-          <p:cNvPr id="2" name="Title 1"/>
-          <p:cNvSpPr>
-            <a:spLocks noGrp="1"/>
-          </p:cNvSpPr>
-          <p:nvPr>
-            <p:ph type="title"/>
-          </p:nvPr>
-        </p:nvSpPr>
-        <p:spPr/>
-        <p:txBody>
-          <a:bodyPr/>
-          <a:lstStyle/>
-          <a:p>
-            <a:r>
-              <a:t>Key Points</a:t>
-            </a:r>
-          </a:p>
-        </p:txBody>
-      </p:sp>
-      <p:sp>
-        <p:nvSpPr>
-          <p:cNvPr id="3" name="Content Placeholder 2"/>
-          <p:cNvSpPr>
-            <a:spLocks noGrp="1"/>
-          </p:cNvSpPr>
-          <p:nvPr>
-            <p:ph idx="1"/>
-          </p:nvPr>
-        </p:nvSpPr>
-        <p:spPr/>
-        <p:txBody>
-          <a:bodyPr/>
-          <a:lstStyle/>
-          <a:p>
-            <a:r>
-              <a:t>Standard work hours are from 9 AM to 5 PM, Monday to Friday</a:t>
-            </a:r>
-          </a:p>
-          <a:p>
-            <a:r>
-              <a:t>Overtime is compensated at x1.5 regular pay for extra hours</a:t>
-            </a:r>
-          </a:p>
-        </p:txBody>
-      </p:sp>
-    </p:spTree>
-  </p:cSld>
-  <p:clrMapOvr>
-    <a:masterClrMapping/>
-  </p:clrMapOvr>
-</p:sld>
-</file>
-
-<file path=ppt/slides/slide15.xml><?xml version="1.0" encoding="utf-8"?>
-<p:sld xmlns:a="http://schemas.openxmlformats.org/drawingml/2006/main" xmlns:p="http://schemas.openxmlformats.org/presentationml/2006/main" xmlns:r="http://schemas.openxmlformats.org/officeDocument/2006/relationships">
-  <p:cSld>
-    <p:spTree>
-      <p:nvGrpSpPr>
-        <p:cNvPr id="1" name=""/>
-        <p:cNvGrpSpPr/>
-        <p:nvPr/>
-      </p:nvGrpSpPr>
-      <p:grpSpPr/>
-      <p:sp>
-        <p:nvSpPr>
-          <p:cNvPr id="2" name="Title 1"/>
-          <p:cNvSpPr>
-            <a:spLocks noGrp="1"/>
-          </p:cNvSpPr>
-          <p:nvPr>
-            <p:ph type="title"/>
-          </p:nvPr>
-        </p:nvSpPr>
-        <p:spPr/>
-        <p:txBody>
-          <a:bodyPr/>
-          <a:lstStyle/>
-          <a:p/>
-        </p:txBody>
-      </p:sp>
-      <p:sp>
-        <p:nvSpPr>
-          <p:cNvPr id="3" name="Content Placeholder 2"/>
-          <p:cNvSpPr>
-            <a:spLocks noGrp="1"/>
-          </p:cNvSpPr>
-          <p:nvPr>
-            <p:ph idx="1"/>
-          </p:nvPr>
-        </p:nvSpPr>
-        <p:spPr/>
-        <p:txBody>
-          <a:bodyPr/>
-          <a:lstStyle/>
-          <a:p>
-            <a:r>
-              <a:t>Remote work is subject to approval based on role requirements</a:t>
-            </a:r>
-          </a:p>
-          <a:p>
-            <a:r>
-              <a:t>Cybersecurity protocols must be followed when accessing company systems remotely .</a:t>
-            </a:r>
-          </a:p>
-        </p:txBody>
-      </p:sp>
-    </p:spTree>
-  </p:cSld>
-  <p:clrMapOvr>
-    <a:masterClrMapping/>
-  </p:clrMapOvr>
-</p:sld>
-</file>
-
-<file path=ppt/slides/slide16.xml><?xml version="1.0" encoding="utf-8"?>
-<p:sld xmlns:a="http://schemas.openxmlformats.org/drawingml/2006/main" xmlns:p="http://schemas.openxmlformats.org/presentationml/2006/main" xmlns:r="http://schemas.openxmlformats.org/officeDocument/2006/relationships">
-  <p:cSld>
-    <p:spTree>
-      <p:nvGrpSpPr>
-        <p:cNvPr id="1" name=""/>
-        <p:cNvGrpSpPr/>
-        <p:nvPr/>
-      </p:nvGrpSpPr>
-      <p:grpSpPr/>
-      <p:sp>
-        <p:nvSpPr>
-          <p:cNvPr id="2" name="Title 1"/>
-          <p:cNvSpPr>
-            <a:spLocks noGrp="1"/>
-          </p:cNvSpPr>
-          <p:nvPr>
-            <p:ph type="title"/>
-          </p:nvPr>
-        </p:nvSpPr>
-        <p:spPr/>
-        <p:txBody>
-          <a:bodyPr/>
-          <a:lstStyle/>
-          <a:p>
-            <a:r>
-              <a:t>Key Points</a:t>
-            </a:r>
-          </a:p>
-        </p:txBody>
-      </p:sp>
-      <p:sp>
-        <p:nvSpPr>
-          <p:cNvPr id="3" name="Content Placeholder 2"/>
-          <p:cNvSpPr>
-            <a:spLocks noGrp="1"/>
-          </p:cNvSpPr>
-          <p:nvPr>
-            <p:ph idx="1"/>
-          </p:nvPr>
-        </p:nvSpPr>
-        <p:spPr/>
-        <p:txBody>
-          <a:bodyPr/>
-          <a:lstStyle/>
-          <a:p>
-            <a:r>
-              <a:t>Ethics Hotline or reporting system for employees to report unethical behavior or concerns without fear of retaliation</a:t>
-            </a:r>
-          </a:p>
-          <a:p>
-            <a:r>
-              <a:t>Disciplinary actions may include warnings, suspension, or termination</a:t>
-            </a:r>
-          </a:p>
-        </p:txBody>
-      </p:sp>
-    </p:spTree>
-  </p:cSld>
-  <p:clrMapOvr>
-    <a:masterClrMapping/>
-  </p:clrMapOvr>
-</p:sld>
-</file>
-
-<file path=ppt/slides/slide17.xml><?xml version="1.0" encoding="utf-8"?>
-<p:sld xmlns:a="http://schemas.openxmlformats.org/drawingml/2006/main" xmlns:p="http://schemas.openxmlformats.org/presentationml/2006/main" xmlns:r="http://schemas.openxmlformats.org/officeDocument/2006/relationships">
-  <p:cSld>
-    <p:spTree>
-      <p:nvGrpSpPr>
-        <p:cNvPr id="1" name=""/>
-        <p:cNvGrpSpPr/>
-        <p:nvPr/>
-      </p:nvGrpSpPr>
-      <p:grpSpPr/>
-      <p:sp>
-        <p:nvSpPr>
-          <p:cNvPr id="2" name="Title 1"/>
-          <p:cNvSpPr>
-            <a:spLocks noGrp="1"/>
-          </p:cNvSpPr>
-          <p:nvPr>
-            <p:ph type="title"/>
-          </p:nvPr>
-        </p:nvSpPr>
-        <p:spPr/>
-        <p:txBody>
-          <a:bodyPr/>
-          <a:lstStyle/>
-          <a:p/>
-        </p:txBody>
-      </p:sp>
-      <p:sp>
-        <p:nvSpPr>
-          <p:cNvPr id="3" name="Content Placeholder 2"/>
-          <p:cNvSpPr>
-            <a:spLocks noGrp="1"/>
-          </p:cNvSpPr>
-          <p:nvPr>
-            <p:ph idx="1"/>
-          </p:nvPr>
-        </p:nvSpPr>
-        <p:spPr/>
-        <p:txBody>
-          <a:bodyPr/>
-          <a:lstStyle/>
-          <a:p>
-            <a:r>
-              <a:t>Open-Door Policy: Employees may approach HR, direct managers, or senior leadership to discuss ethical concerns without formal procedures .</a:t>
-            </a:r>
-          </a:p>
-        </p:txBody>
-      </p:sp>
-    </p:spTree>
-  </p:cSld>
-  <p:clrMapOvr>
-    <a:masterClrMapping/>
-  </p:clrMapOvr>
-</p:sld>
-</file>
-
-<file path=ppt/slides/slide18.xml><?xml version="1.0" encoding="utf-8"?>
-<p:sld xmlns:a="http://schemas.openxmlformats.org/drawingml/2006/main" xmlns:p="http://schemas.openxmlformats.org/presentationml/2006/main" xmlns:r="http://schemas.openxmlformats.org/officeDocument/2006/relationships">
-  <p:cSld>
-    <p:spTree>
-      <p:nvGrpSpPr>
-        <p:cNvPr id="1" name=""/>
-        <p:cNvGrpSpPr/>
-        <p:nvPr/>
-      </p:nvGrpSpPr>
-      <p:grpSpPr/>
-      <p:sp>
-        <p:nvSpPr>
-          <p:cNvPr id="2" name="Title 1"/>
-          <p:cNvSpPr>
-            <a:spLocks noGrp="1"/>
-          </p:cNvSpPr>
-          <p:nvPr>
-            <p:ph type="title"/>
-          </p:nvPr>
-        </p:nvSpPr>
-        <p:spPr/>
-        <p:txBody>
-          <a:bodyPr/>
-          <a:lstStyle/>
-          <a:p>
-            <a:r>
-              <a:t>Key Points</a:t>
-            </a:r>
-          </a:p>
-        </p:txBody>
-      </p:sp>
-      <p:sp>
-        <p:nvSpPr>
-          <p:cNvPr id="3" name="Content Placeholder 2"/>
-          <p:cNvSpPr>
-            <a:spLocks noGrp="1"/>
-          </p:cNvSpPr>
-          <p:nvPr>
-            <p:ph idx="1"/>
-          </p:nvPr>
-        </p:nvSpPr>
-        <p:spPr/>
-        <p:txBody>
-          <a:bodyPr/>
-          <a:lstStyle/>
-          <a:p>
-            <a:r>
-              <a:t>Tier 1 – Entry-Level (Interns, Junior Developers, Support Staff) Employees in this tier perform basic tasks such as coding, testing, and assisting senior staff</a:t>
-            </a:r>
-          </a:p>
-          <a:p>
-            <a:r>
-              <a:t>Tier 2 – Mid-Level employees are responsible for designing, coding, leading small teams, executing projects, and managing financial operations</a:t>
-            </a:r>
-          </a:p>
-        </p:txBody>
-      </p:sp>
-    </p:spTree>
-  </p:cSld>
-  <p:clrMapOvr>
-    <a:masterClrMapping/>
-  </p:clrMapOvr>
-</p:sld>
-</file>
-
-<file path=ppt/slides/slide19.xml><?xml version="1.0" encoding="utf-8"?>
-<p:sld xmlns:a="http://schemas.openxmlformats.org/drawingml/2006/main" xmlns:p="http://schemas.openxmlformats.org/presentationml/2006/main" xmlns:r="http://schemas.openxmlformats.org/officeDocument/2006/relationships">
-  <p:cSld>
-    <p:spTree>
-      <p:nvGrpSpPr>
-        <p:cNvPr id="1" name=""/>
-        <p:cNvGrpSpPr/>
-        <p:nvPr/>
-      </p:nvGrpSpPr>
-      <p:grpSpPr/>
-      <p:sp>
-        <p:nvSpPr>
-          <p:cNvPr id="2" name="Title 1"/>
-          <p:cNvSpPr>
-            <a:spLocks noGrp="1"/>
-          </p:cNvSpPr>
-          <p:nvPr>
-            <p:ph type="title"/>
-          </p:nvPr>
-        </p:nvSpPr>
-        <p:spPr/>
-        <p:txBody>
-          <a:bodyPr/>
-          <a:lstStyle/>
-          <a:p/>
-        </p:txBody>
-      </p:sp>
-      <p:sp>
-        <p:nvSpPr>
-          <p:cNvPr id="3" name="Content Placeholder 2"/>
-          <p:cNvSpPr>
-            <a:spLocks noGrp="1"/>
-          </p:cNvSpPr>
-          <p:nvPr>
-            <p:ph idx="1"/>
-          </p:nvPr>
-        </p:nvSpPr>
-        <p:spPr/>
-        <p:txBody>
-          <a:bodyPr/>
-          <a:lstStyle/>
-          <a:p>
-            <a:r>
-              <a:t>Tier 3 – Senior-level (Senior Developers, Managers, HR Heads)</a:t>
+              <a:t>Word-Level LSTM Model for Sentence Completion</a:t>
+            </a:r>
+          </a:p>
+          <a:p>
+            <a:r>
+              <a:t>using Shakespeare’s Plays</a:t>
+            </a:r>
+          </a:p>
+          <a:p>
+            <a:r>
+              <a:t>Afaq Alam</a:t>
+            </a:r>
+          </a:p>
+          <a:p>
+            <a:r>
+              <a:t>B.Sc Data Science</a:t>
+            </a:r>
+          </a:p>
+          <a:p>
+            <a:r>
+              <a:t>NUCES-FAST</a:t>
+            </a:r>
+          </a:p>
+          <a:p>
+            <a:r>
+              <a:t>Islamabad, Pakistan</a:t>
+            </a:r>
+          </a:p>
+          <a:p>
+            <a:r>
+              <a:t>Abstract—This paper presents a word-level Long Short-Term</a:t>
+            </a:r>
+          </a:p>
+          <a:p>
+            <a:r>
+              <a:t>Memory (LSTM) model trained on Shakespeare’s plays to predict</a:t>
+            </a:r>
+          </a:p>
+          <a:p>
+            <a:r>
+              <a:t>the next word in a sequence. The model is trained using</a:t>
+            </a:r>
+          </a:p>
+          <a:p>
+            <a:r>
+              <a:t>TensorFlow and Keras on a dataset containing Shakespearean</a:t>
+            </a:r>
+          </a:p>
+          <a:p>
+            <a:r>
+              <a:t>dialogues</a:t>
             </a:r>
           </a:p>
         </p:txBody>
@@ -3868,314 +3242,12 @@
           <a:lstStyle/>
           <a:p>
             <a:r>
-              <a:t>The BitBlocks Policy Framework provides a clear guide for ethical conduct across all organizational levels of BitBlocks</a:t>
-            </a:r>
-          </a:p>
-          <a:p>
-            <a:r>
-              <a:t>The policy framework outlines foundational principles of integrity, respect, and professionalism</a:t>
-            </a:r>
-          </a:p>
-        </p:txBody>
-      </p:sp>
-    </p:spTree>
-  </p:cSld>
-  <p:clrMapOvr>
-    <a:masterClrMapping/>
-  </p:clrMapOvr>
-</p:sld>
-</file>
-
-<file path=ppt/slides/slide20.xml><?xml version="1.0" encoding="utf-8"?>
-<p:sld xmlns:a="http://schemas.openxmlformats.org/drawingml/2006/main" xmlns:p="http://schemas.openxmlformats.org/presentationml/2006/main" xmlns:r="http://schemas.openxmlformats.org/officeDocument/2006/relationships">
-  <p:cSld>
-    <p:spTree>
-      <p:nvGrpSpPr>
-        <p:cNvPr id="1" name=""/>
-        <p:cNvGrpSpPr/>
-        <p:nvPr/>
-      </p:nvGrpSpPr>
-      <p:grpSpPr/>
-      <p:sp>
-        <p:nvSpPr>
-          <p:cNvPr id="2" name="Title 1"/>
-          <p:cNvSpPr>
-            <a:spLocks noGrp="1"/>
-          </p:cNvSpPr>
-          <p:nvPr>
-            <p:ph type="title"/>
-          </p:nvPr>
-        </p:nvSpPr>
-        <p:spPr/>
-        <p:txBody>
-          <a:bodyPr/>
-          <a:lstStyle/>
-          <a:p>
-            <a:r>
-              <a:t>Key Points</a:t>
-            </a:r>
-          </a:p>
-        </p:txBody>
-      </p:sp>
-      <p:sp>
-        <p:nvSpPr>
-          <p:cNvPr id="3" name="Content Placeholder 2"/>
-          <p:cNvSpPr>
-            <a:spLocks noGrp="1"/>
-          </p:cNvSpPr>
-          <p:nvPr>
-            <p:ph idx="1"/>
-          </p:nvPr>
-        </p:nvSpPr>
-        <p:spPr/>
-        <p:txBody>
-          <a:bodyPr/>
-          <a:lstStyle/>
-          <a:p>
-            <a:r>
-              <a:t>Tier 4 – Executive-Level (Directors, C-Suite, Board Members) requires strategic thinking, advanced management, and strong stakeholder communication skills</a:t>
-            </a:r>
-          </a:p>
-          <a:p>
-            <a:r>
-              <a:t>They must possess visionary leadership, corporate governance expertise, and  visionary leadership</a:t>
-            </a:r>
-          </a:p>
-        </p:txBody>
-      </p:sp>
-    </p:spTree>
-  </p:cSld>
-  <p:clrMapOvr>
-    <a:masterClrMapping/>
-  </p:clrMapOvr>
-</p:sld>
-</file>
-
-<file path=ppt/slides/slide21.xml><?xml version="1.0" encoding="utf-8"?>
-<p:sld xmlns:a="http://schemas.openxmlformats.org/drawingml/2006/main" xmlns:p="http://schemas.openxmlformats.org/presentationml/2006/main" xmlns:r="http://schemas.openxmlformats.org/officeDocument/2006/relationships">
-  <p:cSld>
-    <p:spTree>
-      <p:nvGrpSpPr>
-        <p:cNvPr id="1" name=""/>
-        <p:cNvGrpSpPr/>
-        <p:nvPr/>
-      </p:nvGrpSpPr>
-      <p:grpSpPr/>
-      <p:sp>
-        <p:nvSpPr>
-          <p:cNvPr id="2" name="Title 1"/>
-          <p:cNvSpPr>
-            <a:spLocks noGrp="1"/>
-          </p:cNvSpPr>
-          <p:nvPr>
-            <p:ph type="title"/>
-          </p:nvPr>
-        </p:nvSpPr>
-        <p:spPr/>
-        <p:txBody>
-          <a:bodyPr/>
-          <a:lstStyle/>
-          <a:p/>
-        </p:txBody>
-      </p:sp>
-      <p:sp>
-        <p:nvSpPr>
-          <p:cNvPr id="3" name="Content Placeholder 2"/>
-          <p:cNvSpPr>
-            <a:spLocks noGrp="1"/>
-          </p:cNvSpPr>
-          <p:nvPr>
-            <p:ph idx="1"/>
-          </p:nvPr>
-        </p:nvSpPr>
-        <p:spPr/>
-        <p:txBody>
-          <a:bodyPr/>
-          <a:lstStyle/>
-          <a:p>
-            <a:r>
-              <a:t>The BitBlock policy framework will be reviewed by company stakeholders and human  resources within 3 weeks .</a:t>
-            </a:r>
-          </a:p>
-        </p:txBody>
-      </p:sp>
-    </p:spTree>
-  </p:cSld>
-  <p:clrMapOvr>
-    <a:masterClrMapping/>
-  </p:clrMapOvr>
-</p:sld>
-</file>
-
-<file path=ppt/slides/slide22.xml><?xml version="1.0" encoding="utf-8"?>
-<p:sld xmlns:a="http://schemas.openxmlformats.org/drawingml/2006/main" xmlns:p="http://schemas.openxmlformats.org/presentationml/2006/main" xmlns:r="http://schemas.openxmlformats.org/officeDocument/2006/relationships">
-  <p:cSld>
-    <p:spTree>
-      <p:nvGrpSpPr>
-        <p:cNvPr id="1" name=""/>
-        <p:cNvGrpSpPr/>
-        <p:nvPr/>
-      </p:nvGrpSpPr>
-      <p:grpSpPr/>
-      <p:sp>
-        <p:nvSpPr>
-          <p:cNvPr id="2" name="Title 1"/>
-          <p:cNvSpPr>
-            <a:spLocks noGrp="1"/>
-          </p:cNvSpPr>
-          <p:nvPr>
-            <p:ph type="title"/>
-          </p:nvPr>
-        </p:nvSpPr>
-        <p:spPr/>
-        <p:txBody>
-          <a:bodyPr/>
-          <a:lstStyle/>
-          <a:p>
-            <a:r>
-              <a:t>Key Points</a:t>
-            </a:r>
-          </a:p>
-        </p:txBody>
-      </p:sp>
-      <p:sp>
-        <p:nvSpPr>
-          <p:cNvPr id="3" name="Content Placeholder 2"/>
-          <p:cNvSpPr>
-            <a:spLocks noGrp="1"/>
-          </p:cNvSpPr>
-          <p:nvPr>
-            <p:ph idx="1"/>
-          </p:nvPr>
-        </p:nvSpPr>
-        <p:spPr/>
-        <p:txBody>
-          <a:bodyPr/>
-          <a:lstStyle/>
-          <a:p>
-            <a:r>
-              <a:t>Any revision in the proposed changes will undergo the same procedure from the  beginning</a:t>
-            </a:r>
-          </a:p>
-          <a:p>
-            <a:r>
-              <a:t>The changes will be implemented in the same manner from the beginning of the year 2025</a:t>
-            </a:r>
-          </a:p>
-        </p:txBody>
-      </p:sp>
-    </p:spTree>
-  </p:cSld>
-  <p:clrMapOvr>
-    <a:masterClrMapping/>
-  </p:clrMapOvr>
-</p:sld>
-</file>
-
-<file path=ppt/slides/slide23.xml><?xml version="1.0" encoding="utf-8"?>
-<p:sld xmlns:a="http://schemas.openxmlformats.org/drawingml/2006/main" xmlns:p="http://schemas.openxmlformats.org/presentationml/2006/main" xmlns:r="http://schemas.openxmlformats.org/officeDocument/2006/relationships">
-  <p:cSld>
-    <p:spTree>
-      <p:nvGrpSpPr>
-        <p:cNvPr id="1" name=""/>
-        <p:cNvGrpSpPr/>
-        <p:nvPr/>
-      </p:nvGrpSpPr>
-      <p:grpSpPr/>
-      <p:sp>
-        <p:nvSpPr>
-          <p:cNvPr id="2" name="Title 1"/>
-          <p:cNvSpPr>
-            <a:spLocks noGrp="1"/>
-          </p:cNvSpPr>
-          <p:nvPr>
-            <p:ph type="title"/>
-          </p:nvPr>
-        </p:nvSpPr>
-        <p:spPr/>
-        <p:txBody>
-          <a:bodyPr/>
-          <a:lstStyle/>
-          <a:p/>
-        </p:txBody>
-      </p:sp>
-      <p:sp>
-        <p:nvSpPr>
-          <p:cNvPr id="3" name="Content Placeholder 2"/>
-          <p:cNvSpPr>
-            <a:spLocks noGrp="1"/>
-          </p:cNvSpPr>
-          <p:nvPr>
-            <p:ph idx="1"/>
-          </p:nvPr>
-        </p:nvSpPr>
-        <p:spPr/>
-        <p:txBody>
-          <a:bodyPr/>
-          <a:lstStyle/>
-          <a:p>
-            <a:r>
-              <a:t>Any changes will have to be made to comply with the requirements of the current system .</a:t>
-            </a:r>
-          </a:p>
-        </p:txBody>
-      </p:sp>
-    </p:spTree>
-  </p:cSld>
-  <p:clrMapOvr>
-    <a:masterClrMapping/>
-  </p:clrMapOvr>
-</p:sld>
-</file>
-
-<file path=ppt/slides/slide24.xml><?xml version="1.0" encoding="utf-8"?>
-<p:sld xmlns:a="http://schemas.openxmlformats.org/drawingml/2006/main" xmlns:p="http://schemas.openxmlformats.org/presentationml/2006/main" xmlns:r="http://schemas.openxmlformats.org/officeDocument/2006/relationships">
-  <p:cSld>
-    <p:spTree>
-      <p:nvGrpSpPr>
-        <p:cNvPr id="1" name=""/>
-        <p:cNvGrpSpPr/>
-        <p:nvPr/>
-      </p:nvGrpSpPr>
-      <p:grpSpPr/>
-      <p:sp>
-        <p:nvSpPr>
-          <p:cNvPr id="2" name="Title 1"/>
-          <p:cNvSpPr>
-            <a:spLocks noGrp="1"/>
-          </p:cNvSpPr>
-          <p:nvPr>
-            <p:ph type="title"/>
-          </p:nvPr>
-        </p:nvSpPr>
-        <p:spPr/>
-        <p:txBody>
-          <a:bodyPr/>
-          <a:lstStyle/>
-          <a:p>
-            <a:r>
-              <a:t>Summary</a:t>
-            </a:r>
-          </a:p>
-        </p:txBody>
-      </p:sp>
-      <p:sp>
-        <p:nvSpPr>
-          <p:cNvPr id="3" name="Content Placeholder 2"/>
-          <p:cNvSpPr>
-            <a:spLocks noGrp="1"/>
-          </p:cNvSpPr>
-          <p:nvPr>
-            <p:ph idx="1"/>
-          </p:nvPr>
-        </p:nvSpPr>
-        <p:spPr/>
-        <p:txBody>
-          <a:bodyPr/>
-          <a:lstStyle/>
-          <a:p>
-            <a:r>
-              <a:t> Any revision in the proposed changes will undergo the same procedure from the  beginning . The changes will be implemented in the same manner from the beginning of the year 2025 . Any changes will have to be made to comply with the requirements of the current system .</a:t>
+              <a:t>A word-level LSTM model is trained on Shakespeare’s plays to predict the next word in a sequence</a:t>
+            </a:r>
+          </a:p>
+          <a:p>
+            <a:r>
+              <a:t>The model is integrated with a user-friendly interface that provides real-time word suggestions</a:t>
             </a:r>
           </a:p>
         </p:txBody>
@@ -4231,7 +3303,7 @@
           <a:lstStyle/>
           <a:p>
             <a:r>
-              <a:t>The Policy Change Procedure ensures that modifications to the BitBlocks policy are review .</a:t>
+              <a:t>The report discusses the preprocessing steps, model architecture, results, and challenges encountered during implementation .</a:t>
             </a:r>
           </a:p>
         </p:txBody>
@@ -4291,12 +3363,12 @@
           <a:lstStyle/>
           <a:p>
             <a:r>
-              <a:t>All employees must act with honesty, transparency, and fairness in all professional interactions</a:t>
-            </a:r>
-          </a:p>
-          <a:p>
-            <a:r>
-              <a:t>Treat colleagues, clients,janitorial staff, security team and stakeholders with respect</a:t>
+              <a:t>The Shakespeare Plays dataset was obtained from Kaggle and includes dialogues from various plays written by William Shakespeare</a:t>
+            </a:r>
+          </a:p>
+          <a:p>
+            <a:r>
+              <a:t>The study also explores how hyperparameters are used to evaluate the accuracy of the model’s accuracy and evaluates the coherence of the sentences .</a:t>
             </a:r>
           </a:p>
         </p:txBody>
@@ -4333,7 +3405,11 @@
         <p:txBody>
           <a:bodyPr/>
           <a:lstStyle/>
-          <a:p/>
+          <a:p>
+            <a:r>
+              <a:t>Key Points</a:t>
+            </a:r>
+          </a:p>
         </p:txBody>
       </p:sp>
       <p:sp>
@@ -4352,12 +3428,12 @@
           <a:lstStyle/>
           <a:p>
             <a:r>
-              <a:t>Protect sensitive company, client, and user data</a:t>
-            </a:r>
-          </a:p>
-          <a:p>
-            <a:r>
-              <a:t>Adhere to all applicable laws, regulations, and industry standards .</a:t>
+              <a:t>The e300 b128 model achieved 91.14% accuracy</a:t>
+            </a:r>
+          </a:p>
+          <a:p>
+            <a:r>
+              <a:t>Larger batch sizes (e.g., 128) lead to faster convergence but may generalize less than smaller batch sizes</a:t>
             </a:r>
           </a:p>
         </p:txBody>
@@ -4394,11 +3470,7 @@
         <p:txBody>
           <a:bodyPr/>
           <a:lstStyle/>
-          <a:p>
-            <a:r>
-              <a:t>Key Points</a:t>
-            </a:r>
-          </a:p>
+          <a:p/>
         </p:txBody>
       </p:sp>
       <p:sp>
@@ -4417,12 +3489,7 @@
           <a:lstStyle/>
           <a:p>
             <a:r>
-              <a:t>CEO/Board-Level Policies include vision and leadership, accountability, vision and mission</a:t>
-            </a:r>
-          </a:p>
-          <a:p>
-            <a:r>
-              <a:t>Ethical Oversight: Ethical oversight, ensure compliance with the ACM and IEEE codes</a:t>
+              <a:t>Increasing the number of epochs improves accuracy, as seen in the e300 model .</a:t>
             </a:r>
           </a:p>
         </p:txBody>
@@ -4459,7 +3526,11 @@
         <p:txBody>
           <a:bodyPr/>
           <a:lstStyle/>
-          <a:p/>
+          <a:p>
+            <a:r>
+              <a:t>Key Points</a:t>
+            </a:r>
+          </a:p>
         </p:txBody>
       </p:sp>
       <p:sp>
@@ -4478,7 +3549,12 @@
           <a:lstStyle/>
           <a:p>
             <a:r>
-              <a:t>Accountability: Accountability:  Prioritize employees' well-being and mental health .</a:t>
+              <a:t>The e250 b64 model achieves a balance between accu-phthalracy and loss, making it a viable alternative to the highest-performing model</a:t>
+            </a:r>
+          </a:p>
+          <a:p>
+            <a:r>
+              <a:t>A higher number of training epochs and a moderately-high batch size improve model performance, but diminishing returns can occur after a certain threshold .</a:t>
             </a:r>
           </a:p>
         </p:txBody>
@@ -4517,7 +3593,7 @@
           <a:lstStyle/>
           <a:p>
             <a:r>
-              <a:t>Key Points</a:t>
+              <a:t>Summary</a:t>
             </a:r>
           </a:p>
         </p:txBody>
@@ -4538,68 +3614,7 @@
           <a:lstStyle/>
           <a:p>
             <a:r>
-              <a:t>Team Leadership: Foster a collaborative and inclusive work environment where team members feel valued and supported</a:t>
-            </a:r>
-          </a:p>
-          <a:p>
-            <a:r>
-              <a:t>Project Management:  Ensure projects are delivered on time, within budget, and meet quality standards</a:t>
-            </a:r>
-          </a:p>
-        </p:txBody>
-      </p:sp>
-    </p:spTree>
-  </p:cSld>
-  <p:clrMapOvr>
-    <a:masterClrMapping/>
-  </p:clrMapOvr>
-</p:sld>
-</file>
-
-<file path=ppt/slides/slide9.xml><?xml version="1.0" encoding="utf-8"?>
-<p:sld xmlns:a="http://schemas.openxmlformats.org/drawingml/2006/main" xmlns:p="http://schemas.openxmlformats.org/presentationml/2006/main" xmlns:r="http://schemas.openxmlformats.org/officeDocument/2006/relationships">
-  <p:cSld>
-    <p:spTree>
-      <p:nvGrpSpPr>
-        <p:cNvPr id="1" name=""/>
-        <p:cNvGrpSpPr/>
-        <p:nvPr/>
-      </p:nvGrpSpPr>
-      <p:grpSpPr/>
-      <p:sp>
-        <p:nvSpPr>
-          <p:cNvPr id="2" name="Title 1"/>
-          <p:cNvSpPr>
-            <a:spLocks noGrp="1"/>
-          </p:cNvSpPr>
-          <p:nvPr>
-            <p:ph type="title"/>
-          </p:nvPr>
-        </p:nvSpPr>
-        <p:spPr/>
-        <p:txBody>
-          <a:bodyPr/>
-          <a:lstStyle/>
-          <a:p/>
-        </p:txBody>
-      </p:sp>
-      <p:sp>
-        <p:nvSpPr>
-          <p:cNvPr id="3" name="Content Placeholder 2"/>
-          <p:cNvSpPr>
-            <a:spLocks noGrp="1"/>
-          </p:cNvSpPr>
-          <p:nvPr>
-            <p:ph idx="1"/>
-          </p:nvPr>
-        </p:nvSpPr>
-        <p:spPr/>
-        <p:txBody>
-          <a:bodyPr/>
-          <a:lstStyle/>
-          <a:p>
-            <a:r>
-              <a:t>Stakeholder Engagement:  Engage with stakeholders (employees, clients, investors, and the public)</a:t>
+              <a:t> The e250 b64 model achieves a balance between accu-phthalracy and loss, making it a viable alternative to the highest-performing model . A higher number of training epochs and a moderately-high batch size improve model performance, but diminishing returns can occur after a certain threshold .</a:t>
             </a:r>
           </a:p>
         </p:txBody>

</xml_diff>